<commit_message>
Clarified memory map, according to MOS 1.02 allocation
</commit_message>
<xml_diff>
--- a/Memory map.pptx
+++ b/Memory map.pptx
@@ -261,7 +261,7 @@
           <a:p>
             <a:fld id="{F1E73DD7-9FFF-4CD2-8157-0F29965A9FAA}" type="datetimeFigureOut">
               <a:rPr lang="en-NL" smtClean="0"/>
-              <a:t>23/10/2022</a:t>
+              <a:t>02/03/2023</a:t>
             </a:fld>
             <a:endParaRPr lang="en-NL"/>
           </a:p>
@@ -461,7 +461,7 @@
           <a:p>
             <a:fld id="{F1E73DD7-9FFF-4CD2-8157-0F29965A9FAA}" type="datetimeFigureOut">
               <a:rPr lang="en-NL" smtClean="0"/>
-              <a:t>23/10/2022</a:t>
+              <a:t>02/03/2023</a:t>
             </a:fld>
             <a:endParaRPr lang="en-NL"/>
           </a:p>
@@ -671,7 +671,7 @@
           <a:p>
             <a:fld id="{F1E73DD7-9FFF-4CD2-8157-0F29965A9FAA}" type="datetimeFigureOut">
               <a:rPr lang="en-NL" smtClean="0"/>
-              <a:t>23/10/2022</a:t>
+              <a:t>02/03/2023</a:t>
             </a:fld>
             <a:endParaRPr lang="en-NL"/>
           </a:p>
@@ -871,7 +871,7 @@
           <a:p>
             <a:fld id="{F1E73DD7-9FFF-4CD2-8157-0F29965A9FAA}" type="datetimeFigureOut">
               <a:rPr lang="en-NL" smtClean="0"/>
-              <a:t>23/10/2022</a:t>
+              <a:t>02/03/2023</a:t>
             </a:fld>
             <a:endParaRPr lang="en-NL"/>
           </a:p>
@@ -1147,7 +1147,7 @@
           <a:p>
             <a:fld id="{F1E73DD7-9FFF-4CD2-8157-0F29965A9FAA}" type="datetimeFigureOut">
               <a:rPr lang="en-NL" smtClean="0"/>
-              <a:t>23/10/2022</a:t>
+              <a:t>02/03/2023</a:t>
             </a:fld>
             <a:endParaRPr lang="en-NL"/>
           </a:p>
@@ -1415,7 +1415,7 @@
           <a:p>
             <a:fld id="{F1E73DD7-9FFF-4CD2-8157-0F29965A9FAA}" type="datetimeFigureOut">
               <a:rPr lang="en-NL" smtClean="0"/>
-              <a:t>23/10/2022</a:t>
+              <a:t>02/03/2023</a:t>
             </a:fld>
             <a:endParaRPr lang="en-NL"/>
           </a:p>
@@ -1830,7 +1830,7 @@
           <a:p>
             <a:fld id="{F1E73DD7-9FFF-4CD2-8157-0F29965A9FAA}" type="datetimeFigureOut">
               <a:rPr lang="en-NL" smtClean="0"/>
-              <a:t>23/10/2022</a:t>
+              <a:t>02/03/2023</a:t>
             </a:fld>
             <a:endParaRPr lang="en-NL"/>
           </a:p>
@@ -1972,7 +1972,7 @@
           <a:p>
             <a:fld id="{F1E73DD7-9FFF-4CD2-8157-0F29965A9FAA}" type="datetimeFigureOut">
               <a:rPr lang="en-NL" smtClean="0"/>
-              <a:t>23/10/2022</a:t>
+              <a:t>02/03/2023</a:t>
             </a:fld>
             <a:endParaRPr lang="en-NL"/>
           </a:p>
@@ -2085,7 +2085,7 @@
           <a:p>
             <a:fld id="{F1E73DD7-9FFF-4CD2-8157-0F29965A9FAA}" type="datetimeFigureOut">
               <a:rPr lang="en-NL" smtClean="0"/>
-              <a:t>23/10/2022</a:t>
+              <a:t>02/03/2023</a:t>
             </a:fld>
             <a:endParaRPr lang="en-NL"/>
           </a:p>
@@ -2398,7 +2398,7 @@
           <a:p>
             <a:fld id="{F1E73DD7-9FFF-4CD2-8157-0F29965A9FAA}" type="datetimeFigureOut">
               <a:rPr lang="en-NL" smtClean="0"/>
-              <a:t>23/10/2022</a:t>
+              <a:t>02/03/2023</a:t>
             </a:fld>
             <a:endParaRPr lang="en-NL"/>
           </a:p>
@@ -2687,7 +2687,7 @@
           <a:p>
             <a:fld id="{F1E73DD7-9FFF-4CD2-8157-0F29965A9FAA}" type="datetimeFigureOut">
               <a:rPr lang="en-NL" smtClean="0"/>
-              <a:t>23/10/2022</a:t>
+              <a:t>02/03/2023</a:t>
             </a:fld>
             <a:endParaRPr lang="en-NL"/>
           </a:p>
@@ -2930,7 +2930,7 @@
           <a:p>
             <a:fld id="{F1E73DD7-9FFF-4CD2-8157-0F29965A9FAA}" type="datetimeFigureOut">
               <a:rPr lang="en-NL" smtClean="0"/>
-              <a:t>23/10/2022</a:t>
+              <a:t>02/03/2023</a:t>
             </a:fld>
             <a:endParaRPr lang="en-NL"/>
           </a:p>
@@ -3728,8 +3728,8 @@
         </p:nvSpPr>
         <p:spPr>
           <a:xfrm>
-            <a:off x="8225589" y="4496803"/>
-            <a:ext cx="3490161" cy="369332"/>
+            <a:off x="8010525" y="4496803"/>
+            <a:ext cx="3705225" cy="923330"/>
           </a:xfrm>
           <a:prstGeom prst="rect">
             <a:avLst/>
@@ -3742,9 +3742,44 @@
           </a:bodyPr>
           <a:lstStyle/>
           <a:p>
+            <a:pPr>
+              <a:tabLst>
+                <a:tab pos="1708150" algn="l"/>
+              </a:tabLst>
+            </a:pPr>
             <a:r>
               <a:rPr lang="en-US" dirty="0"/>
-              <a:t>MOS RAM area – B.E000 – B.FFFF</a:t>
+              <a:t>MOS *</a:t>
+            </a:r>
+            <a:r>
+              <a:rPr lang="en-US" dirty="0" err="1"/>
+              <a:t>cmd</a:t>
+            </a:r>
+            <a:r>
+              <a:rPr lang="en-US" dirty="0"/>
+              <a:t> area	– B.0000 – B.7FFF</a:t>
+            </a:r>
+          </a:p>
+          <a:p>
+            <a:pPr>
+              <a:tabLst>
+                <a:tab pos="1708150" algn="l"/>
+              </a:tabLst>
+            </a:pPr>
+            <a:r>
+              <a:rPr lang="en-US" dirty="0"/>
+              <a:t>MOS allocated	– B.8000 – B.BFFF</a:t>
+            </a:r>
+          </a:p>
+          <a:p>
+            <a:pPr>
+              <a:tabLst>
+                <a:tab pos="1708150" algn="l"/>
+              </a:tabLst>
+            </a:pPr>
+            <a:r>
+              <a:rPr lang="en-US" dirty="0"/>
+              <a:t>Global heap/stack	– B.C000 – B.FFFF</a:t>
             </a:r>
             <a:endParaRPr lang="en-NL" dirty="0"/>
           </a:p>
@@ -3780,7 +3815,7 @@
           <a:p>
             <a:r>
               <a:rPr lang="en-US" dirty="0"/>
-              <a:t>User code area – 4.0000 – B.DFFF</a:t>
+              <a:t>User code area – 4.0000 – B.7FFF</a:t>
             </a:r>
             <a:endParaRPr lang="en-NL" dirty="0"/>
           </a:p>

</xml_diff>